<commit_message>
Minor changes for CodeMash vendor session
</commit_message>
<xml_diff>
--- a/HTML5MobileAppDevelopmentLessonsLearned.pptx
+++ b/HTML5MobileAppDevelopmentLessonsLearned.pptx
@@ -505,7 +505,7 @@
             <a:fld id="{E6D40A8B-9DB3-D940-9E32-81E2BCF9697E}" type="datetimeFigureOut">
               <a:rPr lang="en-US"/>
               <a:pPr/>
-              <a:t>1/4/13</a:t>
+              <a:t>1/11/13</a:t>
             </a:fld>
             <a:endParaRPr lang="en-US"/>
           </a:p>
@@ -7671,7 +7671,7 @@
           <a:p>
             <a:r>
               <a:rPr lang="en-US" sz="2000" dirty="0" smtClean="0"/>
-              <a:t>jQuery i18n plugin - client side translations</a:t>
+              <a:t>jQuery i18n plugin - client side translation dictionary</a:t>
             </a:r>
             <a:endParaRPr lang="en-US" sz="2000" dirty="0"/>
           </a:p>
@@ -7809,8 +7809,13 @@
             <a:pPr lvl="1"/>
             <a:r>
               <a:rPr lang="en-US" sz="1600" dirty="0" smtClean="0"/>
-              <a:t>Ideal for storing JSON data, state information across pages</a:t>
-            </a:r>
+              <a:t>Ideal for storing JSON data, state </a:t>
+            </a:r>
+            <a:r>
+              <a:rPr lang="en-US" sz="1600" smtClean="0"/>
+              <a:t>information between pages</a:t>
+            </a:r>
+            <a:endParaRPr lang="en-US" sz="1600" dirty="0" smtClean="0"/>
           </a:p>
           <a:p>
             <a:pPr lvl="1"/>
@@ -7982,11 +7987,7 @@
             <a:pPr lvl="1"/>
             <a:r>
               <a:rPr lang="en-US" sz="1400" dirty="0" smtClean="0"/>
-              <a:t>Device independence != screen resolution </a:t>
-            </a:r>
-            <a:r>
-              <a:rPr lang="en-US" sz="1400" dirty="0" smtClean="0"/>
-              <a:t>independence</a:t>
+              <a:t>Device independence != screen resolution independence</a:t>
             </a:r>
           </a:p>
           <a:p>
@@ -8153,7 +8154,7 @@
             <a:pPr lvl="1"/>
             <a:r>
               <a:rPr lang="en-US" dirty="0" smtClean="0"/>
-              <a:t>Only way to debug on device</a:t>
+              <a:t>Only way to trace execution on device</a:t>
             </a:r>
             <a:endParaRPr lang="en-US" dirty="0"/>
           </a:p>

</xml_diff>